<commit_message>
finished post "installer R"
</commit_message>
<xml_diff>
--- a/_site/figures.pptx
+++ b/_site/figures.pptx
@@ -7,6 +7,7 @@
   <p:sldIdLst>
     <p:sldId id="256" r:id="rId2"/>
     <p:sldId id="257" r:id="rId3"/>
+    <p:sldId id="258" r:id="rId4"/>
   </p:sldIdLst>
   <p:sldSz cx="12192000" cy="6858000"/>
   <p:notesSz cx="6858000" cy="9144000"/>
@@ -105,6 +106,11 @@
       </a:defRPr>
     </a:lvl9pPr>
   </p:defaultTextStyle>
+  <p:extLst>
+    <p:ext uri="{EFAFB233-063F-42B5-8137-9DF3F51BA10A}">
+      <p15:sldGuideLst xmlns:p15="http://schemas.microsoft.com/office/powerpoint/2012/main"/>
+    </p:ext>
+  </p:extLst>
 </p:presentation>
 </file>
 
@@ -3424,7 +3430,7 @@
             <a:graphicData uri="http://schemas.openxmlformats.org/presentationml/2006/ole">
               <mc:AlternateContent xmlns:mc="http://schemas.openxmlformats.org/markup-compatibility/2006">
                 <mc:Choice xmlns:v="urn:schemas-microsoft-com:vml" Requires="v">
-                  <p:oleObj spid="_x0000_s1028" name="Bitmap Image" r:id="rId3" imgW="7620120" imgH="1428840" progId="PBrush">
+                  <p:oleObj spid="_x0000_s1030" name="Bitmap Image" r:id="rId3" imgW="7620120" imgH="1428840" progId="PBrush">
                     <p:embed/>
                   </p:oleObj>
                 </mc:Choice>
@@ -3549,67 +3555,366 @@
           <a:chExt cx="0" cy="0"/>
         </a:xfrm>
       </p:grpSpPr>
-      <p:sp>
-        <p:nvSpPr>
-          <p:cNvPr id="2" name="Titre 1">
-            <a:extLst>
-              <a:ext uri="{FF2B5EF4-FFF2-40B4-BE49-F238E27FC236}">
-                <a16:creationId xmlns:a16="http://schemas.microsoft.com/office/drawing/2014/main" id="{23566134-2CA5-423A-A79C-08E523D87435}"/>
-              </a:ext>
-            </a:extLst>
-          </p:cNvPr>
-          <p:cNvSpPr>
-            <a:spLocks noGrp="1"/>
-          </p:cNvSpPr>
-          <p:nvPr>
-            <p:ph type="title"/>
-          </p:nvPr>
-        </p:nvSpPr>
-        <p:spPr/>
-        <p:txBody>
-          <a:bodyPr/>
-          <a:lstStyle/>
-          <a:p>
-            <a:endParaRPr lang="fr-FR"/>
-          </a:p>
-        </p:txBody>
-      </p:sp>
-      <p:pic>
-        <p:nvPicPr>
-          <p:cNvPr id="7" name="Espace réservé du contenu 6">
-            <a:extLst>
-              <a:ext uri="{FF2B5EF4-FFF2-40B4-BE49-F238E27FC236}">
-                <a16:creationId xmlns:a16="http://schemas.microsoft.com/office/drawing/2014/main" id="{868F664B-3CE2-4250-840B-8EAF9AA0A52B}"/>
-              </a:ext>
-            </a:extLst>
-          </p:cNvPr>
-          <p:cNvPicPr>
-            <a:picLocks noGrp="1" noChangeAspect="1"/>
-          </p:cNvPicPr>
-          <p:nvPr>
-            <p:ph idx="1"/>
-          </p:nvPr>
-        </p:nvPicPr>
-        <p:blipFill>
-          <a:blip r:embed="rId2"/>
-          <a:stretch>
-            <a:fillRect/>
-          </a:stretch>
-        </p:blipFill>
-        <p:spPr>
+      <p:grpSp>
+        <p:nvGrpSpPr>
+          <p:cNvPr id="11" name="Groupe 10">
+            <a:extLst>
+              <a:ext uri="{FF2B5EF4-FFF2-40B4-BE49-F238E27FC236}">
+                <a16:creationId xmlns:a16="http://schemas.microsoft.com/office/drawing/2014/main" id="{0ADBF31A-97C0-496C-B879-89D0891610CB}"/>
+              </a:ext>
+            </a:extLst>
+          </p:cNvPr>
+          <p:cNvGrpSpPr/>
+          <p:nvPr/>
+        </p:nvGrpSpPr>
+        <p:grpSpPr>
           <a:xfrm>
-            <a:off x="3395238" y="3130048"/>
-            <a:ext cx="5401524" cy="1798476"/>
+            <a:off x="65832" y="1687372"/>
+            <a:ext cx="12060333" cy="2010056"/>
+            <a:chOff x="65832" y="1687372"/>
+            <a:chExt cx="12060333" cy="2010056"/>
           </a:xfrm>
-          <a:prstGeom prst="rect">
-            <a:avLst/>
-          </a:prstGeom>
-        </p:spPr>
-      </p:pic>
+        </p:grpSpPr>
+        <p:pic>
+          <p:nvPicPr>
+            <p:cNvPr id="6" name="Image 5">
+              <a:extLst>
+                <a:ext uri="{FF2B5EF4-FFF2-40B4-BE49-F238E27FC236}">
+                  <a16:creationId xmlns:a16="http://schemas.microsoft.com/office/drawing/2014/main" id="{5B90902B-10E6-468A-8CBD-FD3891354494}"/>
+                </a:ext>
+              </a:extLst>
+            </p:cNvPr>
+            <p:cNvPicPr>
+              <a:picLocks noChangeAspect="1"/>
+            </p:cNvPicPr>
+            <p:nvPr/>
+          </p:nvPicPr>
+          <p:blipFill>
+            <a:blip r:embed="rId2">
+              <a:extLst>
+                <a:ext uri="{28A0092B-C50C-407E-A947-70E740481C1C}">
+                  <a14:useLocalDpi xmlns:a14="http://schemas.microsoft.com/office/drawing/2010/main" val="0"/>
+                </a:ext>
+              </a:extLst>
+            </a:blip>
+            <a:stretch>
+              <a:fillRect/>
+            </a:stretch>
+          </p:blipFill>
+          <p:spPr>
+            <a:xfrm>
+              <a:off x="65832" y="1687372"/>
+              <a:ext cx="12060333" cy="2010056"/>
+            </a:xfrm>
+            <a:prstGeom prst="rect">
+              <a:avLst/>
+            </a:prstGeom>
+          </p:spPr>
+        </p:pic>
+        <p:sp>
+          <p:nvSpPr>
+            <p:cNvPr id="10" name="Rectangle 9">
+              <a:extLst>
+                <a:ext uri="{FF2B5EF4-FFF2-40B4-BE49-F238E27FC236}">
+                  <a16:creationId xmlns:a16="http://schemas.microsoft.com/office/drawing/2014/main" id="{C97BAE80-0DA6-4D73-AC77-871C9A7A15BF}"/>
+                </a:ext>
+              </a:extLst>
+            </p:cNvPr>
+            <p:cNvSpPr/>
+            <p:nvPr/>
+          </p:nvSpPr>
+          <p:spPr>
+            <a:xfrm>
+              <a:off x="406401" y="3124200"/>
+              <a:ext cx="2040466" cy="174201"/>
+            </a:xfrm>
+            <a:prstGeom prst="rect">
+              <a:avLst/>
+            </a:prstGeom>
+            <a:noFill/>
+            <a:ln w="28575">
+              <a:solidFill>
+                <a:srgbClr val="FF0000"/>
+              </a:solidFill>
+            </a:ln>
+          </p:spPr>
+          <p:style>
+            <a:lnRef idx="2">
+              <a:schemeClr val="accent1">
+                <a:shade val="50000"/>
+              </a:schemeClr>
+            </a:lnRef>
+            <a:fillRef idx="1">
+              <a:schemeClr val="accent1"/>
+            </a:fillRef>
+            <a:effectRef idx="0">
+              <a:schemeClr val="accent1"/>
+            </a:effectRef>
+            <a:fontRef idx="minor">
+              <a:schemeClr val="lt1"/>
+            </a:fontRef>
+          </p:style>
+          <p:txBody>
+            <a:bodyPr rtlCol="0" anchor="ctr"/>
+            <a:lstStyle/>
+            <a:p>
+              <a:pPr algn="ctr"/>
+              <a:endParaRPr lang="fr-FR"/>
+            </a:p>
+          </p:txBody>
+        </p:sp>
+      </p:grpSp>
+      <p:grpSp>
+        <p:nvGrpSpPr>
+          <p:cNvPr id="15" name="Groupe 14">
+            <a:extLst>
+              <a:ext uri="{FF2B5EF4-FFF2-40B4-BE49-F238E27FC236}">
+                <a16:creationId xmlns:a16="http://schemas.microsoft.com/office/drawing/2014/main" id="{45087D6E-F6BA-4C42-8272-A2B6CD551194}"/>
+              </a:ext>
+            </a:extLst>
+          </p:cNvPr>
+          <p:cNvGrpSpPr/>
+          <p:nvPr/>
+        </p:nvGrpSpPr>
+        <p:grpSpPr>
+          <a:xfrm>
+            <a:off x="770782" y="3869185"/>
+            <a:ext cx="10650436" cy="1666542"/>
+            <a:chOff x="770782" y="3869185"/>
+            <a:chExt cx="10650436" cy="1666542"/>
+          </a:xfrm>
+        </p:grpSpPr>
+        <p:pic>
+          <p:nvPicPr>
+            <p:cNvPr id="13" name="Image 12">
+              <a:extLst>
+                <a:ext uri="{FF2B5EF4-FFF2-40B4-BE49-F238E27FC236}">
+                  <a16:creationId xmlns:a16="http://schemas.microsoft.com/office/drawing/2014/main" id="{AFE3A60A-A969-4501-B9B1-E26870753F9D}"/>
+                </a:ext>
+              </a:extLst>
+            </p:cNvPr>
+            <p:cNvPicPr>
+              <a:picLocks noChangeAspect="1"/>
+            </p:cNvPicPr>
+            <p:nvPr/>
+          </p:nvPicPr>
+          <p:blipFill rotWithShape="1">
+            <a:blip r:embed="rId3">
+              <a:extLst>
+                <a:ext uri="{28A0092B-C50C-407E-A947-70E740481C1C}">
+                  <a14:useLocalDpi xmlns:a14="http://schemas.microsoft.com/office/drawing/2010/main" val="0"/>
+                </a:ext>
+              </a:extLst>
+            </a:blip>
+            <a:srcRect b="40293"/>
+            <a:stretch/>
+          </p:blipFill>
+          <p:spPr>
+            <a:xfrm>
+              <a:off x="770782" y="3869185"/>
+              <a:ext cx="10650436" cy="1666542"/>
+            </a:xfrm>
+            <a:prstGeom prst="rect">
+              <a:avLst/>
+            </a:prstGeom>
+          </p:spPr>
+        </p:pic>
+        <p:sp>
+          <p:nvSpPr>
+            <p:cNvPr id="14" name="Rectangle 13">
+              <a:extLst>
+                <a:ext uri="{FF2B5EF4-FFF2-40B4-BE49-F238E27FC236}">
+                  <a16:creationId xmlns:a16="http://schemas.microsoft.com/office/drawing/2014/main" id="{FA99359A-6308-49D4-8229-4F379B74AAE3}"/>
+                </a:ext>
+              </a:extLst>
+            </p:cNvPr>
+            <p:cNvSpPr/>
+            <p:nvPr/>
+          </p:nvSpPr>
+          <p:spPr>
+            <a:xfrm>
+              <a:off x="872068" y="4580468"/>
+              <a:ext cx="431799" cy="287866"/>
+            </a:xfrm>
+            <a:prstGeom prst="rect">
+              <a:avLst/>
+            </a:prstGeom>
+            <a:noFill/>
+            <a:ln w="28575">
+              <a:solidFill>
+                <a:srgbClr val="FF0000"/>
+              </a:solidFill>
+            </a:ln>
+          </p:spPr>
+          <p:style>
+            <a:lnRef idx="2">
+              <a:schemeClr val="accent1">
+                <a:shade val="50000"/>
+              </a:schemeClr>
+            </a:lnRef>
+            <a:fillRef idx="1">
+              <a:schemeClr val="accent1"/>
+            </a:fillRef>
+            <a:effectRef idx="0">
+              <a:schemeClr val="accent1"/>
+            </a:effectRef>
+            <a:fontRef idx="minor">
+              <a:schemeClr val="lt1"/>
+            </a:fontRef>
+          </p:style>
+          <p:txBody>
+            <a:bodyPr rtlCol="0" anchor="ctr"/>
+            <a:lstStyle/>
+            <a:p>
+              <a:pPr algn="ctr"/>
+              <a:endParaRPr lang="fr-FR"/>
+            </a:p>
+          </p:txBody>
+        </p:sp>
+      </p:grpSp>
     </p:spTree>
     <p:extLst>
       <p:ext uri="{BB962C8B-B14F-4D97-AF65-F5344CB8AC3E}">
         <p14:creationId xmlns:p14="http://schemas.microsoft.com/office/powerpoint/2010/main" val="2852833104"/>
+      </p:ext>
+    </p:extLst>
+  </p:cSld>
+  <p:clrMapOvr>
+    <a:masterClrMapping/>
+  </p:clrMapOvr>
+</p:sld>
+</file>
+
+<file path=ppt/slides/slide3.xml><?xml version="1.0" encoding="utf-8"?>
+<p:sld xmlns:a="http://schemas.openxmlformats.org/drawingml/2006/main" xmlns:r="http://schemas.openxmlformats.org/officeDocument/2006/relationships" xmlns:p="http://schemas.openxmlformats.org/presentationml/2006/main">
+  <p:cSld>
+    <p:spTree>
+      <p:nvGrpSpPr>
+        <p:cNvPr id="1" name=""/>
+        <p:cNvGrpSpPr/>
+        <p:nvPr/>
+      </p:nvGrpSpPr>
+      <p:grpSpPr>
+        <a:xfrm>
+          <a:off x="0" y="0"/>
+          <a:ext cx="0" cy="0"/>
+          <a:chOff x="0" y="0"/>
+          <a:chExt cx="0" cy="0"/>
+        </a:xfrm>
+      </p:grpSpPr>
+      <p:grpSp>
+        <p:nvGrpSpPr>
+          <p:cNvPr id="7" name="Groupe 6">
+            <a:extLst>
+              <a:ext uri="{FF2B5EF4-FFF2-40B4-BE49-F238E27FC236}">
+                <a16:creationId xmlns:a16="http://schemas.microsoft.com/office/drawing/2014/main" id="{A830868B-A8D9-41AE-8582-0E084D4CD5D0}"/>
+              </a:ext>
+            </a:extLst>
+          </p:cNvPr>
+          <p:cNvGrpSpPr/>
+          <p:nvPr/>
+        </p:nvGrpSpPr>
+        <p:grpSpPr>
+          <a:xfrm>
+            <a:off x="1671020" y="2709762"/>
+            <a:ext cx="8849960" cy="1438476"/>
+            <a:chOff x="1671020" y="2709762"/>
+            <a:chExt cx="8849960" cy="1438476"/>
+          </a:xfrm>
+        </p:grpSpPr>
+        <p:pic>
+          <p:nvPicPr>
+            <p:cNvPr id="5" name="Image 4">
+              <a:extLst>
+                <a:ext uri="{FF2B5EF4-FFF2-40B4-BE49-F238E27FC236}">
+                  <a16:creationId xmlns:a16="http://schemas.microsoft.com/office/drawing/2014/main" id="{E1CA3905-DE1E-4706-90B7-79D9D5D3634E}"/>
+                </a:ext>
+              </a:extLst>
+            </p:cNvPr>
+            <p:cNvPicPr>
+              <a:picLocks noChangeAspect="1"/>
+            </p:cNvPicPr>
+            <p:nvPr/>
+          </p:nvPicPr>
+          <p:blipFill>
+            <a:blip r:embed="rId2">
+              <a:extLst>
+                <a:ext uri="{28A0092B-C50C-407E-A947-70E740481C1C}">
+                  <a14:useLocalDpi xmlns:a14="http://schemas.microsoft.com/office/drawing/2010/main" val="0"/>
+                </a:ext>
+              </a:extLst>
+            </a:blip>
+            <a:stretch>
+              <a:fillRect/>
+            </a:stretch>
+          </p:blipFill>
+          <p:spPr>
+            <a:xfrm>
+              <a:off x="1671020" y="2709762"/>
+              <a:ext cx="8849960" cy="1438476"/>
+            </a:xfrm>
+            <a:prstGeom prst="rect">
+              <a:avLst/>
+            </a:prstGeom>
+          </p:spPr>
+        </p:pic>
+        <p:sp>
+          <p:nvSpPr>
+            <p:cNvPr id="6" name="Rectangle 5">
+              <a:extLst>
+                <a:ext uri="{FF2B5EF4-FFF2-40B4-BE49-F238E27FC236}">
+                  <a16:creationId xmlns:a16="http://schemas.microsoft.com/office/drawing/2014/main" id="{B5AC4B60-D1B7-4E5F-9BAF-17B8A9E6F57A}"/>
+                </a:ext>
+              </a:extLst>
+            </p:cNvPr>
+            <p:cNvSpPr/>
+            <p:nvPr/>
+          </p:nvSpPr>
+          <p:spPr>
+            <a:xfrm>
+              <a:off x="1862668" y="3285067"/>
+              <a:ext cx="3869265" cy="287866"/>
+            </a:xfrm>
+            <a:prstGeom prst="rect">
+              <a:avLst/>
+            </a:prstGeom>
+            <a:noFill/>
+            <a:ln w="28575">
+              <a:solidFill>
+                <a:srgbClr val="FF0000"/>
+              </a:solidFill>
+            </a:ln>
+          </p:spPr>
+          <p:style>
+            <a:lnRef idx="2">
+              <a:schemeClr val="accent1">
+                <a:shade val="50000"/>
+              </a:schemeClr>
+            </a:lnRef>
+            <a:fillRef idx="1">
+              <a:schemeClr val="accent1"/>
+            </a:fillRef>
+            <a:effectRef idx="0">
+              <a:schemeClr val="accent1"/>
+            </a:effectRef>
+            <a:fontRef idx="minor">
+              <a:schemeClr val="lt1"/>
+            </a:fontRef>
+          </p:style>
+          <p:txBody>
+            <a:bodyPr rtlCol="0" anchor="ctr"/>
+            <a:lstStyle/>
+            <a:p>
+              <a:pPr algn="ctr"/>
+              <a:endParaRPr lang="fr-FR"/>
+            </a:p>
+          </p:txBody>
+        </p:sp>
+      </p:grpSp>
+    </p:spTree>
+    <p:extLst>
+      <p:ext uri="{BB962C8B-B14F-4D97-AF65-F5344CB8AC3E}">
+        <p14:creationId xmlns:p14="http://schemas.microsoft.com/office/powerpoint/2010/main" val="2848350415"/>
       </p:ext>
     </p:extLst>
   </p:cSld>

</xml_diff>